<commit_message>
colocando fotos de cada integrante
agora os slides têm as fotos de cada integrante da equipe
tempo total: 30 minutos
</commit_message>
<xml_diff>
--- a/doc/Slides/Sprint 3.pptx
+++ b/doc/Slides/Sprint 3.pptx
@@ -253,7 +253,7 @@
           <a:p>
             <a:fld id="{7013E62F-F7CB-4C95-9EA6-5AB8DFD107B2}" type="datetimeFigureOut">
               <a:rPr lang="en-US" smtClean="0"/>
-              <a:t>5/4/2021</a:t>
+              <a:t>5/5/2021</a:t>
             </a:fld>
             <a:endParaRPr lang="en-US"/>
           </a:p>
@@ -785,7 +785,7 @@
             <a:fld id="{1D8BD707-D9CF-40AE-B4C6-C98DA3205C09}" type="datetimeFigureOut">
               <a:rPr lang="en-US" smtClean="0"/>
               <a:pPr/>
-              <a:t>5/4/2021</a:t>
+              <a:t>5/5/2021</a:t>
             </a:fld>
             <a:endParaRPr lang="en-US"/>
           </a:p>
@@ -950,7 +950,7 @@
             <a:fld id="{1D8BD707-D9CF-40AE-B4C6-C98DA3205C09}" type="datetimeFigureOut">
               <a:rPr lang="en-US" smtClean="0"/>
               <a:pPr/>
-              <a:t>5/4/2021</a:t>
+              <a:t>5/5/2021</a:t>
             </a:fld>
             <a:endParaRPr lang="en-US"/>
           </a:p>
@@ -1125,7 +1125,7 @@
             <a:fld id="{1D8BD707-D9CF-40AE-B4C6-C98DA3205C09}" type="datetimeFigureOut">
               <a:rPr lang="en-US" smtClean="0"/>
               <a:pPr/>
-              <a:t>5/4/2021</a:t>
+              <a:t>5/5/2021</a:t>
             </a:fld>
             <a:endParaRPr lang="en-US"/>
           </a:p>
@@ -1290,7 +1290,7 @@
             <a:fld id="{1D8BD707-D9CF-40AE-B4C6-C98DA3205C09}" type="datetimeFigureOut">
               <a:rPr lang="en-US" smtClean="0"/>
               <a:pPr/>
-              <a:t>5/4/2021</a:t>
+              <a:t>5/5/2021</a:t>
             </a:fld>
             <a:endParaRPr lang="en-US"/>
           </a:p>
@@ -1532,7 +1532,7 @@
             <a:fld id="{1D8BD707-D9CF-40AE-B4C6-C98DA3205C09}" type="datetimeFigureOut">
               <a:rPr lang="en-US" smtClean="0"/>
               <a:pPr/>
-              <a:t>5/4/2021</a:t>
+              <a:t>5/5/2021</a:t>
             </a:fld>
             <a:endParaRPr lang="en-US"/>
           </a:p>
@@ -1814,7 +1814,7 @@
             <a:fld id="{1D8BD707-D9CF-40AE-B4C6-C98DA3205C09}" type="datetimeFigureOut">
               <a:rPr lang="en-US" smtClean="0"/>
               <a:pPr/>
-              <a:t>5/4/2021</a:t>
+              <a:t>5/5/2021</a:t>
             </a:fld>
             <a:endParaRPr lang="en-US"/>
           </a:p>
@@ -2230,7 +2230,7 @@
             <a:fld id="{1D8BD707-D9CF-40AE-B4C6-C98DA3205C09}" type="datetimeFigureOut">
               <a:rPr lang="en-US" smtClean="0"/>
               <a:pPr/>
-              <a:t>5/4/2021</a:t>
+              <a:t>5/5/2021</a:t>
             </a:fld>
             <a:endParaRPr lang="en-US"/>
           </a:p>
@@ -2344,7 +2344,7 @@
             <a:fld id="{1D8BD707-D9CF-40AE-B4C6-C98DA3205C09}" type="datetimeFigureOut">
               <a:rPr lang="en-US" smtClean="0"/>
               <a:pPr/>
-              <a:t>5/4/2021</a:t>
+              <a:t>5/5/2021</a:t>
             </a:fld>
             <a:endParaRPr lang="en-US"/>
           </a:p>
@@ -2436,7 +2436,7 @@
             <a:fld id="{1D8BD707-D9CF-40AE-B4C6-C98DA3205C09}" type="datetimeFigureOut">
               <a:rPr lang="en-US" smtClean="0"/>
               <a:pPr/>
-              <a:t>5/4/2021</a:t>
+              <a:t>5/5/2021</a:t>
             </a:fld>
             <a:endParaRPr lang="en-US"/>
           </a:p>
@@ -2708,7 +2708,7 @@
             <a:fld id="{1D8BD707-D9CF-40AE-B4C6-C98DA3205C09}" type="datetimeFigureOut">
               <a:rPr lang="en-US" smtClean="0"/>
               <a:pPr/>
-              <a:t>5/4/2021</a:t>
+              <a:t>5/5/2021</a:t>
             </a:fld>
             <a:endParaRPr lang="en-US"/>
           </a:p>
@@ -2957,7 +2957,7 @@
             <a:fld id="{1D8BD707-D9CF-40AE-B4C6-C98DA3205C09}" type="datetimeFigureOut">
               <a:rPr lang="en-US" smtClean="0"/>
               <a:pPr/>
-              <a:t>5/4/2021</a:t>
+              <a:t>5/5/2021</a:t>
             </a:fld>
             <a:endParaRPr lang="en-US"/>
           </a:p>
@@ -3165,7 +3165,7 @@
             <a:fld id="{1D8BD707-D9CF-40AE-B4C6-C98DA3205C09}" type="datetimeFigureOut">
               <a:rPr lang="en-US" smtClean="0"/>
               <a:pPr/>
-              <a:t>5/4/2021</a:t>
+              <a:t>5/5/2021</a:t>
             </a:fld>
             <a:endParaRPr lang="en-US"/>
           </a:p>
@@ -8095,77 +8095,6 @@
       </p:grpSp>
       <p:grpSp>
         <p:nvGrpSpPr>
-          <p:cNvPr id="13" name="Group 13"/>
-          <p:cNvGrpSpPr>
-            <a:grpSpLocks noChangeAspect="1"/>
-          </p:cNvGrpSpPr>
-          <p:nvPr/>
-        </p:nvGrpSpPr>
-        <p:grpSpPr>
-          <a:xfrm>
-            <a:off x="8348524" y="4996206"/>
-            <a:ext cx="1517995" cy="1517989"/>
-            <a:chOff x="0" y="0"/>
-            <a:chExt cx="6350000" cy="6349975"/>
-          </a:xfrm>
-        </p:grpSpPr>
-        <p:sp>
-          <p:nvSpPr>
-            <p:cNvPr id="14" name="Freeform 14"/>
-            <p:cNvSpPr/>
-            <p:nvPr/>
-          </p:nvSpPr>
-          <p:spPr>
-            <a:xfrm>
-              <a:off x="0" y="0"/>
-              <a:ext cx="6350000" cy="6349974"/>
-            </a:xfrm>
-            <a:custGeom>
-              <a:avLst/>
-              <a:gdLst/>
-              <a:ahLst/>
-              <a:cxnLst/>
-              <a:rect l="l" t="t" r="r" b="b"/>
-              <a:pathLst>
-                <a:path w="6350000" h="6349974">
-                  <a:moveTo>
-                    <a:pt x="6350000" y="3175025"/>
-                  </a:moveTo>
-                  <a:cubicBezTo>
-                    <a:pt x="6350000" y="4928451"/>
-                    <a:pt x="4928476" y="6349974"/>
-                    <a:pt x="3175000" y="6349974"/>
-                  </a:cubicBezTo>
-                  <a:cubicBezTo>
-                    <a:pt x="1421498" y="6349974"/>
-                    <a:pt x="0" y="4928451"/>
-                    <a:pt x="0" y="3175025"/>
-                  </a:cubicBezTo>
-                  <a:cubicBezTo>
-                    <a:pt x="0" y="1421511"/>
-                    <a:pt x="1421498" y="0"/>
-                    <a:pt x="3175000" y="0"/>
-                  </a:cubicBezTo>
-                  <a:cubicBezTo>
-                    <a:pt x="4928501" y="0"/>
-                    <a:pt x="6350000" y="1421511"/>
-                    <a:pt x="6350000" y="3175025"/>
-                  </a:cubicBezTo>
-                  <a:close/>
-                </a:path>
-              </a:pathLst>
-            </a:custGeom>
-            <a:blipFill>
-              <a:blip r:embed="rId6"/>
-              <a:stretch>
-                <a:fillRect l="-11602" r="-50792" b="-8399"/>
-              </a:stretch>
-            </a:blipFill>
-          </p:spPr>
-        </p:sp>
-      </p:grpSp>
-      <p:grpSp>
-        <p:nvGrpSpPr>
           <p:cNvPr id="15" name="Group 15"/>
           <p:cNvGrpSpPr/>
           <p:nvPr/>
@@ -8271,77 +8200,6 @@
               </a:r>
             </a:p>
           </p:txBody>
-        </p:sp>
-      </p:grpSp>
-      <p:grpSp>
-        <p:nvGrpSpPr>
-          <p:cNvPr id="18" name="Group 18"/>
-          <p:cNvGrpSpPr>
-            <a:grpSpLocks noChangeAspect="1"/>
-          </p:cNvGrpSpPr>
-          <p:nvPr/>
-        </p:nvGrpSpPr>
-        <p:grpSpPr>
-          <a:xfrm>
-            <a:off x="3650865" y="4996206"/>
-            <a:ext cx="1517995" cy="1517989"/>
-            <a:chOff x="0" y="0"/>
-            <a:chExt cx="6350000" cy="6349975"/>
-          </a:xfrm>
-        </p:grpSpPr>
-        <p:sp>
-          <p:nvSpPr>
-            <p:cNvPr id="19" name="Freeform 19"/>
-            <p:cNvSpPr/>
-            <p:nvPr/>
-          </p:nvSpPr>
-          <p:spPr>
-            <a:xfrm>
-              <a:off x="0" y="0"/>
-              <a:ext cx="6350000" cy="6349974"/>
-            </a:xfrm>
-            <a:custGeom>
-              <a:avLst/>
-              <a:gdLst/>
-              <a:ahLst/>
-              <a:cxnLst/>
-              <a:rect l="l" t="t" r="r" b="b"/>
-              <a:pathLst>
-                <a:path w="6350000" h="6349974">
-                  <a:moveTo>
-                    <a:pt x="6350000" y="3175025"/>
-                  </a:moveTo>
-                  <a:cubicBezTo>
-                    <a:pt x="6350000" y="4928451"/>
-                    <a:pt x="4928476" y="6349974"/>
-                    <a:pt x="3175000" y="6349974"/>
-                  </a:cubicBezTo>
-                  <a:cubicBezTo>
-                    <a:pt x="1421498" y="6349974"/>
-                    <a:pt x="0" y="4928451"/>
-                    <a:pt x="0" y="3175025"/>
-                  </a:cubicBezTo>
-                  <a:cubicBezTo>
-                    <a:pt x="0" y="1421511"/>
-                    <a:pt x="1421498" y="0"/>
-                    <a:pt x="3175000" y="0"/>
-                  </a:cubicBezTo>
-                  <a:cubicBezTo>
-                    <a:pt x="4928501" y="0"/>
-                    <a:pt x="6350000" y="1421511"/>
-                    <a:pt x="6350000" y="3175025"/>
-                  </a:cubicBezTo>
-                  <a:close/>
-                </a:path>
-              </a:pathLst>
-            </a:custGeom>
-            <a:blipFill>
-              <a:blip r:embed="rId7"/>
-              <a:stretch>
-                <a:fillRect l="-269735" t="-93124" r="-263900" b="-229565"/>
-              </a:stretch>
-            </a:blipFill>
-          </p:spPr>
         </p:sp>
       </p:grpSp>
       <p:grpSp>
@@ -8455,77 +8313,6 @@
       </p:grpSp>
       <p:grpSp>
         <p:nvGrpSpPr>
-          <p:cNvPr id="23" name="Group 23"/>
-          <p:cNvGrpSpPr>
-            <a:grpSpLocks noChangeAspect="1"/>
-          </p:cNvGrpSpPr>
-          <p:nvPr/>
-        </p:nvGrpSpPr>
-        <p:grpSpPr>
-          <a:xfrm>
-            <a:off x="13082661" y="4996206"/>
-            <a:ext cx="1517995" cy="1517989"/>
-            <a:chOff x="0" y="0"/>
-            <a:chExt cx="6350000" cy="6349975"/>
-          </a:xfrm>
-        </p:grpSpPr>
-        <p:sp>
-          <p:nvSpPr>
-            <p:cNvPr id="24" name="Freeform 24"/>
-            <p:cNvSpPr/>
-            <p:nvPr/>
-          </p:nvSpPr>
-          <p:spPr>
-            <a:xfrm>
-              <a:off x="0" y="0"/>
-              <a:ext cx="6350000" cy="6349974"/>
-            </a:xfrm>
-            <a:custGeom>
-              <a:avLst/>
-              <a:gdLst/>
-              <a:ahLst/>
-              <a:cxnLst/>
-              <a:rect l="l" t="t" r="r" b="b"/>
-              <a:pathLst>
-                <a:path w="6350000" h="6349974">
-                  <a:moveTo>
-                    <a:pt x="6350000" y="3175025"/>
-                  </a:moveTo>
-                  <a:cubicBezTo>
-                    <a:pt x="6350000" y="4928451"/>
-                    <a:pt x="4928476" y="6349974"/>
-                    <a:pt x="3175000" y="6349974"/>
-                  </a:cubicBezTo>
-                  <a:cubicBezTo>
-                    <a:pt x="1421498" y="6349974"/>
-                    <a:pt x="0" y="4928451"/>
-                    <a:pt x="0" y="3175025"/>
-                  </a:cubicBezTo>
-                  <a:cubicBezTo>
-                    <a:pt x="0" y="1421511"/>
-                    <a:pt x="1421498" y="0"/>
-                    <a:pt x="3175000" y="0"/>
-                  </a:cubicBezTo>
-                  <a:cubicBezTo>
-                    <a:pt x="4928501" y="0"/>
-                    <a:pt x="6350000" y="1421511"/>
-                    <a:pt x="6350000" y="3175025"/>
-                  </a:cubicBezTo>
-                  <a:close/>
-                </a:path>
-              </a:pathLst>
-            </a:custGeom>
-            <a:blipFill>
-              <a:blip r:embed="rId8"/>
-              <a:stretch>
-                <a:fillRect l="-19678" r="-30321"/>
-              </a:stretch>
-            </a:blipFill>
-          </p:spPr>
-        </p:sp>
-      </p:grpSp>
-      <p:grpSp>
-        <p:nvGrpSpPr>
           <p:cNvPr id="25" name="Group 25"/>
           <p:cNvGrpSpPr/>
           <p:nvPr/>
@@ -8630,6 +8417,111 @@
           </p:txBody>
         </p:sp>
       </p:grpSp>
+      <p:pic>
+        <p:nvPicPr>
+          <p:cNvPr id="30" name="Imagem 29" descr="Homem de camisa preta&#10;&#10;Descrição gerada automaticamente">
+            <a:extLst>
+              <a:ext uri="{FF2B5EF4-FFF2-40B4-BE49-F238E27FC236}">
+                <a16:creationId xmlns:a16="http://schemas.microsoft.com/office/drawing/2014/main" id="{B7945331-912E-4F09-9D5B-DE3972CADD97}"/>
+              </a:ext>
+            </a:extLst>
+          </p:cNvPr>
+          <p:cNvPicPr>
+            <a:picLocks noChangeAspect="1"/>
+          </p:cNvPicPr>
+          <p:nvPr/>
+        </p:nvPicPr>
+        <p:blipFill rotWithShape="1">
+          <a:blip r:embed="rId6" cstate="print">
+            <a:extLst>
+              <a:ext uri="{28A0092B-C50C-407E-A947-70E740481C1C}">
+                <a14:useLocalDpi xmlns:a14="http://schemas.microsoft.com/office/drawing/2010/main" val="0"/>
+              </a:ext>
+            </a:extLst>
+          </a:blip>
+          <a:srcRect l="13657" t="8140" r="9861" b="36013"/>
+          <a:stretch/>
+        </p:blipFill>
+        <p:spPr>
+          <a:xfrm>
+            <a:off x="3614477" y="4982277"/>
+            <a:ext cx="1517905" cy="1517904"/>
+          </a:xfrm>
+          <a:prstGeom prst="ellipse">
+            <a:avLst/>
+          </a:prstGeom>
+        </p:spPr>
+      </p:pic>
+      <p:pic>
+        <p:nvPicPr>
+          <p:cNvPr id="35" name="Imagem 34" descr="Mulher com a mão no rosto&#10;&#10;Descrição gerada automaticamente com confiança média">
+            <a:extLst>
+              <a:ext uri="{FF2B5EF4-FFF2-40B4-BE49-F238E27FC236}">
+                <a16:creationId xmlns:a16="http://schemas.microsoft.com/office/drawing/2014/main" id="{51675FC0-D235-4814-8615-36F9422D14B1}"/>
+              </a:ext>
+            </a:extLst>
+          </p:cNvPr>
+          <p:cNvPicPr>
+            <a:picLocks noChangeAspect="1"/>
+          </p:cNvPicPr>
+          <p:nvPr/>
+        </p:nvPicPr>
+        <p:blipFill rotWithShape="1">
+          <a:blip r:embed="rId7" cstate="print">
+            <a:extLst>
+              <a:ext uri="{28A0092B-C50C-407E-A947-70E740481C1C}">
+                <a14:useLocalDpi xmlns:a14="http://schemas.microsoft.com/office/drawing/2010/main" val="0"/>
+              </a:ext>
+            </a:extLst>
+          </a:blip>
+          <a:srcRect l="63" t="10991" r="63" b="14103"/>
+          <a:stretch/>
+        </p:blipFill>
+        <p:spPr>
+          <a:xfrm>
+            <a:off x="8327787" y="4982277"/>
+            <a:ext cx="1517904" cy="1517904"/>
+          </a:xfrm>
+          <a:prstGeom prst="ellipse">
+            <a:avLst/>
+          </a:prstGeom>
+        </p:spPr>
+      </p:pic>
+      <p:pic>
+        <p:nvPicPr>
+          <p:cNvPr id="37" name="Imagem 36" descr="Mulher com cabelos longos&#10;&#10;Descrição gerada automaticamente">
+            <a:extLst>
+              <a:ext uri="{FF2B5EF4-FFF2-40B4-BE49-F238E27FC236}">
+                <a16:creationId xmlns:a16="http://schemas.microsoft.com/office/drawing/2014/main" id="{2008734B-2EEA-46F3-92EA-0C0C2D46DB1B}"/>
+              </a:ext>
+            </a:extLst>
+          </p:cNvPr>
+          <p:cNvPicPr>
+            <a:picLocks noChangeAspect="1"/>
+          </p:cNvPicPr>
+          <p:nvPr/>
+        </p:nvPicPr>
+        <p:blipFill rotWithShape="1">
+          <a:blip r:embed="rId8" cstate="print">
+            <a:extLst>
+              <a:ext uri="{28A0092B-C50C-407E-A947-70E740481C1C}">
+                <a14:useLocalDpi xmlns:a14="http://schemas.microsoft.com/office/drawing/2010/main" val="0"/>
+              </a:ext>
+            </a:extLst>
+          </a:blip>
+          <a:srcRect l="236" t="4899" r="-236" b="20101"/>
+          <a:stretch/>
+        </p:blipFill>
+        <p:spPr>
+          <a:xfrm>
+            <a:off x="13095062" y="4982277"/>
+            <a:ext cx="1517904" cy="1517904"/>
+          </a:xfrm>
+          <a:prstGeom prst="ellipse">
+            <a:avLst/>
+          </a:prstGeom>
+        </p:spPr>
+      </p:pic>
     </p:spTree>
   </p:cSld>
   <p:clrMapOvr>
@@ -9058,77 +8950,6 @@
       </p:grpSp>
       <p:grpSp>
         <p:nvGrpSpPr>
-          <p:cNvPr id="13" name="Group 13"/>
-          <p:cNvGrpSpPr>
-            <a:grpSpLocks noChangeAspect="1"/>
-          </p:cNvGrpSpPr>
-          <p:nvPr/>
-        </p:nvGrpSpPr>
-        <p:grpSpPr>
-          <a:xfrm>
-            <a:off x="8348524" y="4996206"/>
-            <a:ext cx="1517995" cy="1517989"/>
-            <a:chOff x="0" y="0"/>
-            <a:chExt cx="6350000" cy="6349975"/>
-          </a:xfrm>
-        </p:grpSpPr>
-        <p:sp>
-          <p:nvSpPr>
-            <p:cNvPr id="14" name="Freeform 14"/>
-            <p:cNvSpPr/>
-            <p:nvPr/>
-          </p:nvSpPr>
-          <p:spPr>
-            <a:xfrm>
-              <a:off x="0" y="0"/>
-              <a:ext cx="6350000" cy="6349974"/>
-            </a:xfrm>
-            <a:custGeom>
-              <a:avLst/>
-              <a:gdLst/>
-              <a:ahLst/>
-              <a:cxnLst/>
-              <a:rect l="l" t="t" r="r" b="b"/>
-              <a:pathLst>
-                <a:path w="6350000" h="6349974">
-                  <a:moveTo>
-                    <a:pt x="6350000" y="3175025"/>
-                  </a:moveTo>
-                  <a:cubicBezTo>
-                    <a:pt x="6350000" y="4928451"/>
-                    <a:pt x="4928476" y="6349974"/>
-                    <a:pt x="3175000" y="6349974"/>
-                  </a:cubicBezTo>
-                  <a:cubicBezTo>
-                    <a:pt x="1421498" y="6349974"/>
-                    <a:pt x="0" y="4928451"/>
-                    <a:pt x="0" y="3175025"/>
-                  </a:cubicBezTo>
-                  <a:cubicBezTo>
-                    <a:pt x="0" y="1421511"/>
-                    <a:pt x="1421498" y="0"/>
-                    <a:pt x="3175000" y="0"/>
-                  </a:cubicBezTo>
-                  <a:cubicBezTo>
-                    <a:pt x="4928501" y="0"/>
-                    <a:pt x="6350000" y="1421511"/>
-                    <a:pt x="6350000" y="3175025"/>
-                  </a:cubicBezTo>
-                  <a:close/>
-                </a:path>
-              </a:pathLst>
-            </a:custGeom>
-            <a:blipFill>
-              <a:blip r:embed="rId6"/>
-              <a:stretch>
-                <a:fillRect l="-11602" r="-50792" b="-8399"/>
-              </a:stretch>
-            </a:blipFill>
-          </p:spPr>
-        </p:sp>
-      </p:grpSp>
-      <p:grpSp>
-        <p:nvGrpSpPr>
           <p:cNvPr id="15" name="Group 15"/>
           <p:cNvGrpSpPr/>
           <p:nvPr/>
@@ -9246,77 +9067,6 @@
               </a:endParaRPr>
             </a:p>
           </p:txBody>
-        </p:sp>
-      </p:grpSp>
-      <p:grpSp>
-        <p:nvGrpSpPr>
-          <p:cNvPr id="18" name="Group 18"/>
-          <p:cNvGrpSpPr>
-            <a:grpSpLocks noChangeAspect="1"/>
-          </p:cNvGrpSpPr>
-          <p:nvPr/>
-        </p:nvGrpSpPr>
-        <p:grpSpPr>
-          <a:xfrm>
-            <a:off x="3650865" y="4996206"/>
-            <a:ext cx="1517995" cy="1517989"/>
-            <a:chOff x="0" y="0"/>
-            <a:chExt cx="6350000" cy="6349975"/>
-          </a:xfrm>
-        </p:grpSpPr>
-        <p:sp>
-          <p:nvSpPr>
-            <p:cNvPr id="19" name="Freeform 19"/>
-            <p:cNvSpPr/>
-            <p:nvPr/>
-          </p:nvSpPr>
-          <p:spPr>
-            <a:xfrm>
-              <a:off x="0" y="0"/>
-              <a:ext cx="6350000" cy="6349974"/>
-            </a:xfrm>
-            <a:custGeom>
-              <a:avLst/>
-              <a:gdLst/>
-              <a:ahLst/>
-              <a:cxnLst/>
-              <a:rect l="l" t="t" r="r" b="b"/>
-              <a:pathLst>
-                <a:path w="6350000" h="6349974">
-                  <a:moveTo>
-                    <a:pt x="6350000" y="3175025"/>
-                  </a:moveTo>
-                  <a:cubicBezTo>
-                    <a:pt x="6350000" y="4928451"/>
-                    <a:pt x="4928476" y="6349974"/>
-                    <a:pt x="3175000" y="6349974"/>
-                  </a:cubicBezTo>
-                  <a:cubicBezTo>
-                    <a:pt x="1421498" y="6349974"/>
-                    <a:pt x="0" y="4928451"/>
-                    <a:pt x="0" y="3175025"/>
-                  </a:cubicBezTo>
-                  <a:cubicBezTo>
-                    <a:pt x="0" y="1421511"/>
-                    <a:pt x="1421498" y="0"/>
-                    <a:pt x="3175000" y="0"/>
-                  </a:cubicBezTo>
-                  <a:cubicBezTo>
-                    <a:pt x="4928501" y="0"/>
-                    <a:pt x="6350000" y="1421511"/>
-                    <a:pt x="6350000" y="3175025"/>
-                  </a:cubicBezTo>
-                  <a:close/>
-                </a:path>
-              </a:pathLst>
-            </a:custGeom>
-            <a:blipFill>
-              <a:blip r:embed="rId7"/>
-              <a:stretch>
-                <a:fillRect l="-269735" t="-93124" r="-263900" b="-229565"/>
-              </a:stretch>
-            </a:blipFill>
-          </p:spPr>
         </p:sp>
       </p:grpSp>
       <p:grpSp>
@@ -9433,77 +9183,6 @@
       </p:grpSp>
       <p:grpSp>
         <p:nvGrpSpPr>
-          <p:cNvPr id="23" name="Group 23"/>
-          <p:cNvGrpSpPr>
-            <a:grpSpLocks noChangeAspect="1"/>
-          </p:cNvGrpSpPr>
-          <p:nvPr/>
-        </p:nvGrpSpPr>
-        <p:grpSpPr>
-          <a:xfrm>
-            <a:off x="13082661" y="4996206"/>
-            <a:ext cx="1517995" cy="1517989"/>
-            <a:chOff x="0" y="0"/>
-            <a:chExt cx="6350000" cy="6349975"/>
-          </a:xfrm>
-        </p:grpSpPr>
-        <p:sp>
-          <p:nvSpPr>
-            <p:cNvPr id="24" name="Freeform 24"/>
-            <p:cNvSpPr/>
-            <p:nvPr/>
-          </p:nvSpPr>
-          <p:spPr>
-            <a:xfrm>
-              <a:off x="0" y="0"/>
-              <a:ext cx="6350000" cy="6349974"/>
-            </a:xfrm>
-            <a:custGeom>
-              <a:avLst/>
-              <a:gdLst/>
-              <a:ahLst/>
-              <a:cxnLst/>
-              <a:rect l="l" t="t" r="r" b="b"/>
-              <a:pathLst>
-                <a:path w="6350000" h="6349974">
-                  <a:moveTo>
-                    <a:pt x="6350000" y="3175025"/>
-                  </a:moveTo>
-                  <a:cubicBezTo>
-                    <a:pt x="6350000" y="4928451"/>
-                    <a:pt x="4928476" y="6349974"/>
-                    <a:pt x="3175000" y="6349974"/>
-                  </a:cubicBezTo>
-                  <a:cubicBezTo>
-                    <a:pt x="1421498" y="6349974"/>
-                    <a:pt x="0" y="4928451"/>
-                    <a:pt x="0" y="3175025"/>
-                  </a:cubicBezTo>
-                  <a:cubicBezTo>
-                    <a:pt x="0" y="1421511"/>
-                    <a:pt x="1421498" y="0"/>
-                    <a:pt x="3175000" y="0"/>
-                  </a:cubicBezTo>
-                  <a:cubicBezTo>
-                    <a:pt x="4928501" y="0"/>
-                    <a:pt x="6350000" y="1421511"/>
-                    <a:pt x="6350000" y="3175025"/>
-                  </a:cubicBezTo>
-                  <a:close/>
-                </a:path>
-              </a:pathLst>
-            </a:custGeom>
-            <a:blipFill>
-              <a:blip r:embed="rId8"/>
-              <a:stretch>
-                <a:fillRect l="-19678" r="-30321"/>
-              </a:stretch>
-            </a:blipFill>
-          </p:spPr>
-        </p:sp>
-      </p:grpSp>
-      <p:grpSp>
-        <p:nvGrpSpPr>
           <p:cNvPr id="25" name="Group 25"/>
           <p:cNvGrpSpPr/>
           <p:nvPr/>
@@ -9608,6 +9287,111 @@
           </p:txBody>
         </p:sp>
       </p:grpSp>
+      <p:pic>
+        <p:nvPicPr>
+          <p:cNvPr id="29" name="Imagem 28" descr="Mulher de cabelo comprido&#10;&#10;Descrição gerada automaticamente">
+            <a:extLst>
+              <a:ext uri="{FF2B5EF4-FFF2-40B4-BE49-F238E27FC236}">
+                <a16:creationId xmlns:a16="http://schemas.microsoft.com/office/drawing/2014/main" id="{FB7A7205-4E2B-4A97-8436-5C7A6DC23D0A}"/>
+              </a:ext>
+            </a:extLst>
+          </p:cNvPr>
+          <p:cNvPicPr>
+            <a:picLocks noChangeAspect="1"/>
+          </p:cNvPicPr>
+          <p:nvPr/>
+        </p:nvPicPr>
+        <p:blipFill rotWithShape="1">
+          <a:blip r:embed="rId6" cstate="print">
+            <a:extLst>
+              <a:ext uri="{28A0092B-C50C-407E-A947-70E740481C1C}">
+                <a14:useLocalDpi xmlns:a14="http://schemas.microsoft.com/office/drawing/2010/main" val="0"/>
+              </a:ext>
+            </a:extLst>
+          </a:blip>
+          <a:srcRect l="584" t="7867" r="-584" b="23071"/>
+          <a:stretch/>
+        </p:blipFill>
+        <p:spPr>
+          <a:xfrm>
+            <a:off x="3650910" y="4982277"/>
+            <a:ext cx="1517904" cy="1517904"/>
+          </a:xfrm>
+          <a:prstGeom prst="ellipse">
+            <a:avLst/>
+          </a:prstGeom>
+        </p:spPr>
+      </p:pic>
+      <p:pic>
+        <p:nvPicPr>
+          <p:cNvPr id="31" name="Imagem 30" descr="Mulher sorrindo pousando para foto&#10;&#10;Descrição gerada automaticamente">
+            <a:extLst>
+              <a:ext uri="{FF2B5EF4-FFF2-40B4-BE49-F238E27FC236}">
+                <a16:creationId xmlns:a16="http://schemas.microsoft.com/office/drawing/2014/main" id="{37BAB16A-56B9-4944-BA89-09986A62A126}"/>
+              </a:ext>
+            </a:extLst>
+          </p:cNvPr>
+          <p:cNvPicPr>
+            <a:picLocks noChangeAspect="1"/>
+          </p:cNvPicPr>
+          <p:nvPr/>
+        </p:nvPicPr>
+        <p:blipFill rotWithShape="1">
+          <a:blip r:embed="rId7" cstate="print">
+            <a:extLst>
+              <a:ext uri="{28A0092B-C50C-407E-A947-70E740481C1C}">
+                <a14:useLocalDpi xmlns:a14="http://schemas.microsoft.com/office/drawing/2010/main" val="0"/>
+              </a:ext>
+            </a:extLst>
+          </a:blip>
+          <a:srcRect t="3905" b="21095"/>
+          <a:stretch/>
+        </p:blipFill>
+        <p:spPr>
+          <a:xfrm>
+            <a:off x="8348569" y="4996291"/>
+            <a:ext cx="1517904" cy="1517904"/>
+          </a:xfrm>
+          <a:prstGeom prst="ellipse">
+            <a:avLst/>
+          </a:prstGeom>
+        </p:spPr>
+      </p:pic>
+      <p:pic>
+        <p:nvPicPr>
+          <p:cNvPr id="33" name="Imagem 32" descr="Homem com óculos de grau&#10;&#10;Descrição gerada automaticamente">
+            <a:extLst>
+              <a:ext uri="{FF2B5EF4-FFF2-40B4-BE49-F238E27FC236}">
+                <a16:creationId xmlns:a16="http://schemas.microsoft.com/office/drawing/2014/main" id="{1E097D1F-538F-4DFC-98F5-E87725F08E44}"/>
+              </a:ext>
+            </a:extLst>
+          </p:cNvPr>
+          <p:cNvPicPr>
+            <a:picLocks noChangeAspect="1"/>
+          </p:cNvPicPr>
+          <p:nvPr/>
+        </p:nvPicPr>
+        <p:blipFill rotWithShape="1">
+          <a:blip r:embed="rId8" cstate="print">
+            <a:extLst>
+              <a:ext uri="{28A0092B-C50C-407E-A947-70E740481C1C}">
+                <a14:useLocalDpi xmlns:a14="http://schemas.microsoft.com/office/drawing/2010/main" val="0"/>
+              </a:ext>
+            </a:extLst>
+          </a:blip>
+          <a:srcRect l="494" t="8297" r="-494" b="19917"/>
+          <a:stretch/>
+        </p:blipFill>
+        <p:spPr>
+          <a:xfrm>
+            <a:off x="13082706" y="4984083"/>
+            <a:ext cx="1517904" cy="1517904"/>
+          </a:xfrm>
+          <a:prstGeom prst="ellipse">
+            <a:avLst/>
+          </a:prstGeom>
+        </p:spPr>
+      </p:pic>
     </p:spTree>
     <p:extLst>
       <p:ext uri="{BB962C8B-B14F-4D97-AF65-F5344CB8AC3E}">
@@ -10041,84 +9825,13 @@
       </p:grpSp>
       <p:grpSp>
         <p:nvGrpSpPr>
-          <p:cNvPr id="13" name="Group 13"/>
-          <p:cNvGrpSpPr>
-            <a:grpSpLocks noChangeAspect="1"/>
-          </p:cNvGrpSpPr>
-          <p:nvPr/>
-        </p:nvGrpSpPr>
-        <p:grpSpPr>
-          <a:xfrm>
-            <a:off x="10825585" y="4996206"/>
-            <a:ext cx="1517995" cy="1517989"/>
-            <a:chOff x="0" y="0"/>
-            <a:chExt cx="6350000" cy="6349975"/>
-          </a:xfrm>
-        </p:grpSpPr>
-        <p:sp>
-          <p:nvSpPr>
-            <p:cNvPr id="14" name="Freeform 14"/>
-            <p:cNvSpPr/>
-            <p:nvPr/>
-          </p:nvSpPr>
-          <p:spPr>
-            <a:xfrm>
-              <a:off x="0" y="0"/>
-              <a:ext cx="6350000" cy="6349974"/>
-            </a:xfrm>
-            <a:custGeom>
-              <a:avLst/>
-              <a:gdLst/>
-              <a:ahLst/>
-              <a:cxnLst/>
-              <a:rect l="l" t="t" r="r" b="b"/>
-              <a:pathLst>
-                <a:path w="6350000" h="6349974">
-                  <a:moveTo>
-                    <a:pt x="6350000" y="3175025"/>
-                  </a:moveTo>
-                  <a:cubicBezTo>
-                    <a:pt x="6350000" y="4928451"/>
-                    <a:pt x="4928476" y="6349974"/>
-                    <a:pt x="3175000" y="6349974"/>
-                  </a:cubicBezTo>
-                  <a:cubicBezTo>
-                    <a:pt x="1421498" y="6349974"/>
-                    <a:pt x="0" y="4928451"/>
-                    <a:pt x="0" y="3175025"/>
-                  </a:cubicBezTo>
-                  <a:cubicBezTo>
-                    <a:pt x="0" y="1421511"/>
-                    <a:pt x="1421498" y="0"/>
-                    <a:pt x="3175000" y="0"/>
-                  </a:cubicBezTo>
-                  <a:cubicBezTo>
-                    <a:pt x="4928501" y="0"/>
-                    <a:pt x="6350000" y="1421511"/>
-                    <a:pt x="6350000" y="3175025"/>
-                  </a:cubicBezTo>
-                  <a:close/>
-                </a:path>
-              </a:pathLst>
-            </a:custGeom>
-            <a:blipFill>
-              <a:blip r:embed="rId6"/>
-              <a:stretch>
-                <a:fillRect l="-11602" r="-50792" b="-8399"/>
-              </a:stretch>
-            </a:blipFill>
-          </p:spPr>
-        </p:sp>
-      </p:grpSp>
-      <p:grpSp>
-        <p:nvGrpSpPr>
           <p:cNvPr id="15" name="Group 15"/>
           <p:cNvGrpSpPr/>
           <p:nvPr/>
         </p:nvGrpSpPr>
         <p:grpSpPr>
           <a:xfrm>
-            <a:off x="10062764" y="6849255"/>
+            <a:off x="10062764" y="6696855"/>
             <a:ext cx="3043636" cy="1183376"/>
             <a:chOff x="0" y="-19049"/>
             <a:chExt cx="4058181" cy="1577834"/>
@@ -10224,84 +9937,13 @@
       </p:grpSp>
       <p:grpSp>
         <p:nvGrpSpPr>
-          <p:cNvPr id="18" name="Group 18"/>
-          <p:cNvGrpSpPr>
-            <a:grpSpLocks noChangeAspect="1"/>
-          </p:cNvGrpSpPr>
-          <p:nvPr/>
-        </p:nvGrpSpPr>
-        <p:grpSpPr>
-          <a:xfrm>
-            <a:off x="6127926" y="4996206"/>
-            <a:ext cx="1517995" cy="1517989"/>
-            <a:chOff x="0" y="0"/>
-            <a:chExt cx="6350000" cy="6349975"/>
-          </a:xfrm>
-        </p:grpSpPr>
-        <p:sp>
-          <p:nvSpPr>
-            <p:cNvPr id="19" name="Freeform 19"/>
-            <p:cNvSpPr/>
-            <p:nvPr/>
-          </p:nvSpPr>
-          <p:spPr>
-            <a:xfrm>
-              <a:off x="0" y="0"/>
-              <a:ext cx="6350000" cy="6349974"/>
-            </a:xfrm>
-            <a:custGeom>
-              <a:avLst/>
-              <a:gdLst/>
-              <a:ahLst/>
-              <a:cxnLst/>
-              <a:rect l="l" t="t" r="r" b="b"/>
-              <a:pathLst>
-                <a:path w="6350000" h="6349974">
-                  <a:moveTo>
-                    <a:pt x="6350000" y="3175025"/>
-                  </a:moveTo>
-                  <a:cubicBezTo>
-                    <a:pt x="6350000" y="4928451"/>
-                    <a:pt x="4928476" y="6349974"/>
-                    <a:pt x="3175000" y="6349974"/>
-                  </a:cubicBezTo>
-                  <a:cubicBezTo>
-                    <a:pt x="1421498" y="6349974"/>
-                    <a:pt x="0" y="4928451"/>
-                    <a:pt x="0" y="3175025"/>
-                  </a:cubicBezTo>
-                  <a:cubicBezTo>
-                    <a:pt x="0" y="1421511"/>
-                    <a:pt x="1421498" y="0"/>
-                    <a:pt x="3175000" y="0"/>
-                  </a:cubicBezTo>
-                  <a:cubicBezTo>
-                    <a:pt x="4928501" y="0"/>
-                    <a:pt x="6350000" y="1421511"/>
-                    <a:pt x="6350000" y="3175025"/>
-                  </a:cubicBezTo>
-                  <a:close/>
-                </a:path>
-              </a:pathLst>
-            </a:custGeom>
-            <a:blipFill>
-              <a:blip r:embed="rId7"/>
-              <a:stretch>
-                <a:fillRect l="-269735" t="-93124" r="-263900" b="-229565"/>
-              </a:stretch>
-            </a:blipFill>
-          </p:spPr>
-        </p:sp>
-      </p:grpSp>
-      <p:grpSp>
-        <p:nvGrpSpPr>
           <p:cNvPr id="20" name="Group 20"/>
           <p:cNvGrpSpPr/>
           <p:nvPr/>
         </p:nvGrpSpPr>
         <p:grpSpPr>
           <a:xfrm>
-            <a:off x="5413744" y="6849255"/>
+            <a:off x="5413744" y="6696855"/>
             <a:ext cx="2946359" cy="1183377"/>
             <a:chOff x="0" y="-19049"/>
             <a:chExt cx="3928479" cy="1577834"/>
@@ -10405,6 +10047,76 @@
           </p:txBody>
         </p:sp>
       </p:grpSp>
+      <p:pic>
+        <p:nvPicPr>
+          <p:cNvPr id="24" name="Imagem 23" descr="Homem com óculos de grau&#10;&#10;Descrição gerada automaticamente">
+            <a:extLst>
+              <a:ext uri="{FF2B5EF4-FFF2-40B4-BE49-F238E27FC236}">
+                <a16:creationId xmlns:a16="http://schemas.microsoft.com/office/drawing/2014/main" id="{827FE4F2-6F0A-4F5C-A3E3-648BC2574967}"/>
+              </a:ext>
+            </a:extLst>
+          </p:cNvPr>
+          <p:cNvPicPr>
+            <a:picLocks noChangeAspect="1"/>
+          </p:cNvPicPr>
+          <p:nvPr/>
+        </p:nvPicPr>
+        <p:blipFill rotWithShape="1">
+          <a:blip r:embed="rId6" cstate="print">
+            <a:extLst>
+              <a:ext uri="{28A0092B-C50C-407E-A947-70E740481C1C}">
+                <a14:useLocalDpi xmlns:a14="http://schemas.microsoft.com/office/drawing/2010/main" val="0"/>
+              </a:ext>
+            </a:extLst>
+          </a:blip>
+          <a:srcRect t="3053" b="21453"/>
+          <a:stretch/>
+        </p:blipFill>
+        <p:spPr>
+          <a:xfrm>
+            <a:off x="6127971" y="4991100"/>
+            <a:ext cx="1517904" cy="1517904"/>
+          </a:xfrm>
+          <a:prstGeom prst="ellipse">
+            <a:avLst/>
+          </a:prstGeom>
+        </p:spPr>
+      </p:pic>
+      <p:pic>
+        <p:nvPicPr>
+          <p:cNvPr id="26" name="Imagem 25" descr="Pessoa posando para foto&#10;&#10;Descrição gerada automaticamente">
+            <a:extLst>
+              <a:ext uri="{FF2B5EF4-FFF2-40B4-BE49-F238E27FC236}">
+                <a16:creationId xmlns:a16="http://schemas.microsoft.com/office/drawing/2014/main" id="{6A3A1E9C-67C2-459B-A098-FD2536BFBD40}"/>
+              </a:ext>
+            </a:extLst>
+          </p:cNvPr>
+          <p:cNvPicPr>
+            <a:picLocks noChangeAspect="1"/>
+          </p:cNvPicPr>
+          <p:nvPr/>
+        </p:nvPicPr>
+        <p:blipFill rotWithShape="1">
+          <a:blip r:embed="rId7" cstate="print">
+            <a:extLst>
+              <a:ext uri="{28A0092B-C50C-407E-A947-70E740481C1C}">
+                <a14:useLocalDpi xmlns:a14="http://schemas.microsoft.com/office/drawing/2010/main" val="0"/>
+              </a:ext>
+            </a:extLst>
+          </a:blip>
+          <a:srcRect l="817" t="4487" r="-817" b="21139"/>
+          <a:stretch/>
+        </p:blipFill>
+        <p:spPr>
+          <a:xfrm>
+            <a:off x="10815891" y="4991100"/>
+            <a:ext cx="1517904" cy="1517904"/>
+          </a:xfrm>
+          <a:prstGeom prst="ellipse">
+            <a:avLst/>
+          </a:prstGeom>
+        </p:spPr>
+      </p:pic>
     </p:spTree>
     <p:extLst>
       <p:ext uri="{BB962C8B-B14F-4D97-AF65-F5344CB8AC3E}">

</xml_diff>

<commit_message>
adicionando a parte do burndown
tempo total: 20 minutos
</commit_message>
<xml_diff>
--- a/doc/Slides/Sprint 3.pptx
+++ b/doc/Slides/Sprint 3.pptx
@@ -5,7 +5,7 @@
     <p:sldMasterId id="2147483648" r:id="rId1"/>
   </p:sldMasterIdLst>
   <p:notesMasterIdLst>
-    <p:notesMasterId r:id="rId15"/>
+    <p:notesMasterId r:id="rId16"/>
   </p:notesMasterIdLst>
   <p:sldIdLst>
     <p:sldId id="256" r:id="rId2"/>
@@ -20,33 +20,34 @@
     <p:sldId id="266" r:id="rId11"/>
     <p:sldId id="268" r:id="rId12"/>
     <p:sldId id="270" r:id="rId13"/>
-    <p:sldId id="274" r:id="rId14"/>
+    <p:sldId id="272" r:id="rId14"/>
+    <p:sldId id="274" r:id="rId15"/>
   </p:sldIdLst>
   <p:sldSz cx="18288000" cy="10287000"/>
   <p:notesSz cx="6858000" cy="9144000"/>
   <p:embeddedFontLst>
     <p:embeddedFont>
       <p:font typeface="Calibri" panose="020F0502020204030204" pitchFamily="34" charset="0"/>
-      <p:regular r:id="rId16"/>
-      <p:bold r:id="rId17"/>
-      <p:italic r:id="rId18"/>
-      <p:boldItalic r:id="rId19"/>
+      <p:regular r:id="rId17"/>
+      <p:bold r:id="rId18"/>
+      <p:italic r:id="rId19"/>
+      <p:boldItalic r:id="rId20"/>
     </p:embeddedFont>
     <p:embeddedFont>
       <p:font typeface="Glacial Indifference" panose="020B0604020202020204" charset="0"/>
-      <p:regular r:id="rId20"/>
+      <p:regular r:id="rId21"/>
     </p:embeddedFont>
     <p:embeddedFont>
       <p:font typeface="Glacial Indifference Bold" panose="020B0604020202020204" charset="0"/>
-      <p:regular r:id="rId21"/>
+      <p:regular r:id="rId22"/>
     </p:embeddedFont>
     <p:embeddedFont>
       <p:font typeface="Open Sauce Light" panose="020B0604020202020204" charset="0"/>
-      <p:regular r:id="rId22"/>
+      <p:regular r:id="rId23"/>
     </p:embeddedFont>
     <p:embeddedFont>
       <p:font typeface="Open Sauce Light Bold" panose="020B0604020202020204" charset="0"/>
-      <p:regular r:id="rId23"/>
+      <p:regular r:id="rId24"/>
     </p:embeddedFont>
   </p:embeddedFontLst>
   <p:defaultTextStyle>
@@ -6625,7 +6626,7 @@
                   </a:solidFill>
                   <a:latin typeface="Glacial Indifference"/>
                 </a:rPr>
-                <a:t>Entrega</a:t>
+                <a:t>Parte</a:t>
               </a:r>
               <a:r>
                 <a:rPr lang="en-US" sz="6500" dirty="0">
@@ -6634,7 +6635,7 @@
                   </a:solidFill>
                   <a:latin typeface="Glacial Indifference"/>
                 </a:rPr>
-                <a:t> 03</a:t>
+                <a:t> 03 </a:t>
               </a:r>
             </a:p>
           </p:txBody>
@@ -7178,6 +7179,501 @@
 </file>
 
 <file path=ppt/slides/slide13.xml><?xml version="1.0" encoding="utf-8"?>
+<p:sld xmlns:a="http://schemas.openxmlformats.org/drawingml/2006/main" xmlns:r="http://schemas.openxmlformats.org/officeDocument/2006/relationships" xmlns:p="http://schemas.openxmlformats.org/presentationml/2006/main">
+  <p:cSld>
+    <p:bg>
+      <p:bgPr>
+        <a:solidFill>
+          <a:schemeClr val="accent5">
+            <a:lumMod val="20000"/>
+            <a:lumOff val="80000"/>
+          </a:schemeClr>
+        </a:solidFill>
+        <a:effectLst/>
+      </p:bgPr>
+    </p:bg>
+    <p:spTree>
+      <p:nvGrpSpPr>
+        <p:cNvPr id="1" name=""/>
+        <p:cNvGrpSpPr/>
+        <p:nvPr/>
+      </p:nvGrpSpPr>
+      <p:grpSpPr>
+        <a:xfrm>
+          <a:off x="0" y="0"/>
+          <a:ext cx="0" cy="0"/>
+          <a:chOff x="0" y="0"/>
+          <a:chExt cx="0" cy="0"/>
+        </a:xfrm>
+      </p:grpSpPr>
+      <p:grpSp>
+        <p:nvGrpSpPr>
+          <p:cNvPr id="2" name="Group 2"/>
+          <p:cNvGrpSpPr/>
+          <p:nvPr/>
+        </p:nvGrpSpPr>
+        <p:grpSpPr>
+          <a:xfrm>
+            <a:off x="17499545" y="535253"/>
+            <a:ext cx="493447" cy="493447"/>
+            <a:chOff x="0" y="0"/>
+            <a:chExt cx="657929" cy="657929"/>
+          </a:xfrm>
+        </p:grpSpPr>
+        <p:grpSp>
+          <p:nvGrpSpPr>
+            <p:cNvPr id="3" name="Group 3"/>
+            <p:cNvGrpSpPr>
+              <a:grpSpLocks noChangeAspect="1"/>
+            </p:cNvGrpSpPr>
+            <p:nvPr/>
+          </p:nvGrpSpPr>
+          <p:grpSpPr>
+            <a:xfrm>
+              <a:off x="0" y="0"/>
+              <a:ext cx="657929" cy="657929"/>
+              <a:chOff x="0" y="0"/>
+              <a:chExt cx="6355080" cy="6355080"/>
+            </a:xfrm>
+          </p:grpSpPr>
+          <p:sp>
+            <p:nvSpPr>
+              <p:cNvPr id="4" name="Freeform 4"/>
+              <p:cNvSpPr/>
+              <p:nvPr/>
+            </p:nvSpPr>
+            <p:spPr>
+              <a:xfrm>
+                <a:off x="0" y="0"/>
+                <a:ext cx="6355080" cy="6355080"/>
+              </a:xfrm>
+              <a:custGeom>
+                <a:avLst/>
+                <a:gdLst/>
+                <a:ahLst/>
+                <a:cxnLst/>
+                <a:rect l="l" t="t" r="r" b="b"/>
+                <a:pathLst>
+                  <a:path w="6355080" h="6355080">
+                    <a:moveTo>
+                      <a:pt x="3177540" y="6355080"/>
+                    </a:moveTo>
+                    <a:cubicBezTo>
+                      <a:pt x="2329180" y="6355080"/>
+                      <a:pt x="1530350" y="6024880"/>
+                      <a:pt x="930910" y="5424170"/>
+                    </a:cubicBezTo>
+                    <a:cubicBezTo>
+                      <a:pt x="330200" y="4824730"/>
+                      <a:pt x="0" y="4025900"/>
+                      <a:pt x="0" y="3177540"/>
+                    </a:cubicBezTo>
+                    <a:cubicBezTo>
+                      <a:pt x="0" y="2329180"/>
+                      <a:pt x="330200" y="1530350"/>
+                      <a:pt x="930910" y="930910"/>
+                    </a:cubicBezTo>
+                    <a:cubicBezTo>
+                      <a:pt x="1530350" y="330200"/>
+                      <a:pt x="2329180" y="0"/>
+                      <a:pt x="3177540" y="0"/>
+                    </a:cubicBezTo>
+                    <a:cubicBezTo>
+                      <a:pt x="4025900" y="0"/>
+                      <a:pt x="4824730" y="330200"/>
+                      <a:pt x="5424170" y="930910"/>
+                    </a:cubicBezTo>
+                    <a:cubicBezTo>
+                      <a:pt x="6024880" y="1531620"/>
+                      <a:pt x="6355080" y="2329180"/>
+                      <a:pt x="6355080" y="3177540"/>
+                    </a:cubicBezTo>
+                    <a:cubicBezTo>
+                      <a:pt x="6355080" y="4025900"/>
+                      <a:pt x="6024880" y="4824730"/>
+                      <a:pt x="5424170" y="5424170"/>
+                    </a:cubicBezTo>
+                    <a:cubicBezTo>
+                      <a:pt x="4824730" y="6024880"/>
+                      <a:pt x="4025900" y="6355080"/>
+                      <a:pt x="3177540" y="6355080"/>
+                    </a:cubicBezTo>
+                    <a:close/>
+                    <a:moveTo>
+                      <a:pt x="3177540" y="190500"/>
+                    </a:moveTo>
+                    <a:cubicBezTo>
+                      <a:pt x="2379980" y="190500"/>
+                      <a:pt x="1629410" y="501650"/>
+                      <a:pt x="1065530" y="1065530"/>
+                    </a:cubicBezTo>
+                    <a:cubicBezTo>
+                      <a:pt x="501650" y="1629410"/>
+                      <a:pt x="190500" y="2379980"/>
+                      <a:pt x="190500" y="3177540"/>
+                    </a:cubicBezTo>
+                    <a:cubicBezTo>
+                      <a:pt x="190500" y="3975100"/>
+                      <a:pt x="501650" y="4725670"/>
+                      <a:pt x="1065530" y="5289550"/>
+                    </a:cubicBezTo>
+                    <a:cubicBezTo>
+                      <a:pt x="1629410" y="5853430"/>
+                      <a:pt x="2379980" y="6164580"/>
+                      <a:pt x="3177540" y="6164580"/>
+                    </a:cubicBezTo>
+                    <a:cubicBezTo>
+                      <a:pt x="3975100" y="6164580"/>
+                      <a:pt x="4725670" y="5853430"/>
+                      <a:pt x="5289550" y="5289550"/>
+                    </a:cubicBezTo>
+                    <a:cubicBezTo>
+                      <a:pt x="5853430" y="4725670"/>
+                      <a:pt x="6164580" y="3975100"/>
+                      <a:pt x="6164580" y="3177540"/>
+                    </a:cubicBezTo>
+                    <a:cubicBezTo>
+                      <a:pt x="6164580" y="2379980"/>
+                      <a:pt x="5853430" y="1629410"/>
+                      <a:pt x="5289550" y="1065530"/>
+                    </a:cubicBezTo>
+                    <a:cubicBezTo>
+                      <a:pt x="4725670" y="501650"/>
+                      <a:pt x="3975100" y="190500"/>
+                      <a:pt x="3177540" y="190500"/>
+                    </a:cubicBezTo>
+                    <a:close/>
+                  </a:path>
+                </a:pathLst>
+              </a:custGeom>
+              <a:solidFill>
+                <a:srgbClr val="000000"/>
+              </a:solidFill>
+            </p:spPr>
+          </p:sp>
+        </p:grpSp>
+        <p:pic>
+          <p:nvPicPr>
+            <p:cNvPr id="5" name="Picture 5"/>
+            <p:cNvPicPr>
+              <a:picLocks noChangeAspect="1"/>
+            </p:cNvPicPr>
+            <p:nvPr/>
+          </p:nvPicPr>
+          <p:blipFill>
+            <a:blip r:embed="rId2">
+              <a:extLst>
+                <a:ext uri="{28A0092B-C50C-407E-A947-70E740481C1C}">
+                  <a14:useLocalDpi xmlns:a14="http://schemas.microsoft.com/office/drawing/2010/main" val="0"/>
+                </a:ext>
+                <a:ext uri="{96DAC541-7B7A-43D3-8B79-37D633B846F1}">
+                  <asvg:svgBlip xmlns:asvg="http://schemas.microsoft.com/office/drawing/2016/SVG/main" r:embed="rId3"/>
+                </a:ext>
+              </a:extLst>
+            </a:blip>
+            <a:srcRect/>
+            <a:stretch>
+              <a:fillRect/>
+            </a:stretch>
+          </p:blipFill>
+          <p:spPr>
+            <a:xfrm rot="5400000">
+              <a:off x="109655" y="109655"/>
+              <a:ext cx="438619" cy="438619"/>
+            </a:xfrm>
+            <a:prstGeom prst="rect">
+              <a:avLst/>
+            </a:prstGeom>
+          </p:spPr>
+        </p:pic>
+      </p:grpSp>
+      <p:grpSp>
+        <p:nvGrpSpPr>
+          <p:cNvPr id="6" name="Group 6"/>
+          <p:cNvGrpSpPr/>
+          <p:nvPr/>
+        </p:nvGrpSpPr>
+        <p:grpSpPr>
+          <a:xfrm>
+            <a:off x="1536071" y="2018713"/>
+            <a:ext cx="6069091" cy="6319087"/>
+            <a:chOff x="0" y="0"/>
+            <a:chExt cx="8092121" cy="8425450"/>
+          </a:xfrm>
+        </p:grpSpPr>
+        <p:sp>
+          <p:nvSpPr>
+            <p:cNvPr id="7" name="TextBox 7"/>
+            <p:cNvSpPr txBox="1"/>
+            <p:nvPr/>
+          </p:nvSpPr>
+          <p:spPr>
+            <a:xfrm>
+              <a:off x="0" y="2657194"/>
+              <a:ext cx="8092121" cy="1738773"/>
+            </a:xfrm>
+            <a:prstGeom prst="rect">
+              <a:avLst/>
+            </a:prstGeom>
+          </p:spPr>
+          <p:txBody>
+            <a:bodyPr lIns="0" tIns="0" rIns="0" bIns="0" rtlCol="0" anchor="t">
+              <a:spAutoFit/>
+            </a:bodyPr>
+            <a:lstStyle/>
+            <a:p>
+              <a:pPr algn="ctr">
+                <a:lnSpc>
+                  <a:spcPts val="9900"/>
+                </a:lnSpc>
+              </a:pPr>
+              <a:r>
+                <a:rPr lang="en-US" sz="9000" dirty="0">
+                  <a:solidFill>
+                    <a:srgbClr val="000000"/>
+                  </a:solidFill>
+                  <a:latin typeface="Glacial Indifference"/>
+                </a:rPr>
+                <a:t>Burndown</a:t>
+              </a:r>
+            </a:p>
+          </p:txBody>
+        </p:sp>
+        <p:sp>
+          <p:nvSpPr>
+            <p:cNvPr id="8" name="TextBox 8"/>
+            <p:cNvSpPr txBox="1"/>
+            <p:nvPr/>
+          </p:nvSpPr>
+          <p:spPr>
+            <a:xfrm>
+              <a:off x="1925411" y="4523626"/>
+              <a:ext cx="4241298" cy="1231107"/>
+            </a:xfrm>
+            <a:prstGeom prst="rect">
+              <a:avLst/>
+            </a:prstGeom>
+          </p:spPr>
+          <p:txBody>
+            <a:bodyPr wrap="square" lIns="0" tIns="0" rIns="0" bIns="0" rtlCol="0" anchor="t">
+              <a:spAutoFit/>
+            </a:bodyPr>
+            <a:lstStyle/>
+            <a:p>
+              <a:pPr algn="ctr">
+                <a:lnSpc>
+                  <a:spcPts val="7150"/>
+                </a:lnSpc>
+              </a:pPr>
+              <a:r>
+                <a:rPr lang="en-US" sz="6500" dirty="0" err="1">
+                  <a:solidFill>
+                    <a:srgbClr val="000000"/>
+                  </a:solidFill>
+                  <a:latin typeface="Glacial Indifference"/>
+                </a:rPr>
+                <a:t>Parte</a:t>
+              </a:r>
+              <a:r>
+                <a:rPr lang="en-US" sz="6500" dirty="0">
+                  <a:solidFill>
+                    <a:srgbClr val="000000"/>
+                  </a:solidFill>
+                  <a:latin typeface="Glacial Indifference"/>
+                </a:rPr>
+                <a:t> 04</a:t>
+              </a:r>
+            </a:p>
+          </p:txBody>
+        </p:sp>
+        <p:sp>
+          <p:nvSpPr>
+            <p:cNvPr id="9" name="AutoShape 9"/>
+            <p:cNvSpPr/>
+            <p:nvPr/>
+          </p:nvSpPr>
+          <p:spPr>
+            <a:xfrm rot="-10800000">
+              <a:off x="4033361" y="0"/>
+              <a:ext cx="12700" cy="1963215"/>
+            </a:xfrm>
+            <a:prstGeom prst="rect">
+              <a:avLst/>
+            </a:prstGeom>
+            <a:solidFill>
+              <a:srgbClr val="000000"/>
+            </a:solidFill>
+          </p:spPr>
+        </p:sp>
+        <p:sp>
+          <p:nvSpPr>
+            <p:cNvPr id="10" name="AutoShape 10"/>
+            <p:cNvSpPr/>
+            <p:nvPr/>
+          </p:nvSpPr>
+          <p:spPr>
+            <a:xfrm rot="-10800000">
+              <a:off x="4033361" y="6462235"/>
+              <a:ext cx="12700" cy="1963215"/>
+            </a:xfrm>
+            <a:prstGeom prst="rect">
+              <a:avLst/>
+            </a:prstGeom>
+            <a:solidFill>
+              <a:srgbClr val="000000"/>
+            </a:solidFill>
+          </p:spPr>
+        </p:sp>
+      </p:grpSp>
+      <p:grpSp>
+        <p:nvGrpSpPr>
+          <p:cNvPr id="11" name="Group 11"/>
+          <p:cNvGrpSpPr/>
+          <p:nvPr/>
+        </p:nvGrpSpPr>
+        <p:grpSpPr>
+          <a:xfrm>
+            <a:off x="17144897" y="4848912"/>
+            <a:ext cx="749555" cy="294588"/>
+            <a:chOff x="0" y="0"/>
+            <a:chExt cx="999406" cy="392784"/>
+          </a:xfrm>
+        </p:grpSpPr>
+        <p:sp>
+          <p:nvSpPr>
+            <p:cNvPr id="12" name="TextBox 12"/>
+            <p:cNvSpPr txBox="1"/>
+            <p:nvPr/>
+          </p:nvSpPr>
+          <p:spPr>
+            <a:xfrm>
+              <a:off x="394147" y="-19050"/>
+              <a:ext cx="605260" cy="411834"/>
+            </a:xfrm>
+            <a:prstGeom prst="rect">
+              <a:avLst/>
+            </a:prstGeom>
+          </p:spPr>
+          <p:txBody>
+            <a:bodyPr lIns="0" tIns="0" rIns="0" bIns="0" rtlCol="0" anchor="t">
+              <a:spAutoFit/>
+            </a:bodyPr>
+            <a:lstStyle/>
+            <a:p>
+              <a:pPr algn="r">
+                <a:lnSpc>
+                  <a:spcPts val="2400"/>
+                </a:lnSpc>
+              </a:pPr>
+              <a:r>
+                <a:rPr lang="en-US" sz="2000" spc="200" dirty="0">
+                  <a:solidFill>
+                    <a:srgbClr val="000000"/>
+                  </a:solidFill>
+                  <a:latin typeface="Glacial Indifference Bold"/>
+                </a:rPr>
+                <a:t>14</a:t>
+              </a:r>
+            </a:p>
+          </p:txBody>
+        </p:sp>
+        <p:sp>
+          <p:nvSpPr>
+            <p:cNvPr id="13" name="AutoShape 13"/>
+            <p:cNvSpPr/>
+            <p:nvPr/>
+          </p:nvSpPr>
+          <p:spPr>
+            <a:xfrm rot="-5400000">
+              <a:off x="194137" y="-16317"/>
+              <a:ext cx="43972" cy="432247"/>
+            </a:xfrm>
+            <a:prstGeom prst="rect">
+              <a:avLst/>
+            </a:prstGeom>
+            <a:solidFill>
+              <a:srgbClr val="000000"/>
+            </a:solidFill>
+          </p:spPr>
+        </p:sp>
+      </p:grpSp>
+      <p:pic>
+        <p:nvPicPr>
+          <p:cNvPr id="14" name="Picture 14"/>
+          <p:cNvPicPr>
+            <a:picLocks noChangeAspect="1"/>
+          </p:cNvPicPr>
+          <p:nvPr/>
+        </p:nvPicPr>
+        <p:blipFill>
+          <a:blip r:embed="rId4">
+            <a:extLst>
+              <a:ext uri="{28A0092B-C50C-407E-A947-70E740481C1C}">
+                <a14:useLocalDpi xmlns:a14="http://schemas.microsoft.com/office/drawing/2010/main" val="0"/>
+              </a:ext>
+              <a:ext uri="{96DAC541-7B7A-43D3-8B79-37D633B846F1}">
+                <asvg:svgBlip xmlns:asvg="http://schemas.microsoft.com/office/drawing/2016/SVG/main" r:embed="rId5"/>
+              </a:ext>
+            </a:extLst>
+          </a:blip>
+          <a:srcRect/>
+          <a:stretch>
+            <a:fillRect/>
+          </a:stretch>
+        </p:blipFill>
+        <p:spPr>
+          <a:xfrm>
+            <a:off x="17499545" y="9552243"/>
+            <a:ext cx="394907" cy="262793"/>
+          </a:xfrm>
+          <a:prstGeom prst="rect">
+            <a:avLst/>
+          </a:prstGeom>
+        </p:spPr>
+      </p:pic>
+      <p:pic>
+        <p:nvPicPr>
+          <p:cNvPr id="15" name="Picture 15"/>
+          <p:cNvPicPr>
+            <a:picLocks noChangeAspect="1"/>
+          </p:cNvPicPr>
+          <p:nvPr/>
+        </p:nvPicPr>
+        <p:blipFill>
+          <a:blip r:embed="rId6">
+            <a:extLst>
+              <a:ext uri="{28A0092B-C50C-407E-A947-70E740481C1C}">
+                <a14:useLocalDpi xmlns:a14="http://schemas.microsoft.com/office/drawing/2010/main" val="0"/>
+              </a:ext>
+              <a:ext uri="{96DAC541-7B7A-43D3-8B79-37D633B846F1}">
+                <asvg:svgBlip xmlns:asvg="http://schemas.microsoft.com/office/drawing/2016/SVG/main" r:embed="rId7"/>
+              </a:ext>
+            </a:extLst>
+          </a:blip>
+          <a:srcRect/>
+          <a:stretch>
+            <a:fillRect/>
+          </a:stretch>
+        </p:blipFill>
+        <p:spPr>
+          <a:xfrm>
+            <a:off x="8301877" y="1626910"/>
+            <a:ext cx="8065814" cy="7631390"/>
+          </a:xfrm>
+          <a:prstGeom prst="rect">
+            <a:avLst/>
+          </a:prstGeom>
+        </p:spPr>
+      </p:pic>
+    </p:spTree>
+  </p:cSld>
+  <p:clrMapOvr>
+    <a:masterClrMapping/>
+  </p:clrMapOvr>
+</p:sld>
+</file>
+
+<file path=ppt/slides/slide14.xml><?xml version="1.0" encoding="utf-8"?>
 <p:sld xmlns:a="http://schemas.openxmlformats.org/drawingml/2006/main" xmlns:r="http://schemas.openxmlformats.org/officeDocument/2006/relationships" xmlns:p="http://schemas.openxmlformats.org/presentationml/2006/main">
   <p:cSld>
     <p:bg>

</xml_diff>